<commit_message>
Update change context sequence diagram
</commit_message>
<xml_diff>
--- a/docs/diagrams/ChangeContextSdForModel.pptx
+++ b/docs/diagrams/ChangeContextSdForModel.pptx
@@ -3457,7 +3457,7 @@
         <p:spPr>
           <a:xfrm>
             <a:off x="7162800" y="1447800"/>
-            <a:ext cx="3867926" cy="3733800"/>
+            <a:ext cx="3867926" cy="4324082"/>
           </a:xfrm>
           <a:prstGeom prst="roundRect">
             <a:avLst>
@@ -3599,10 +3599,10 @@
         </p:nvCxnSpPr>
         <p:spPr>
           <a:xfrm>
-            <a:off x="7931268" y="2101075"/>
-            <a:ext cx="0" cy="2855075"/>
-          </a:xfrm>
-          <a:prstGeom prst="line">
+            <a:off x="7931275" y="2101068"/>
+            <a:ext cx="0" cy="3537732"/>
+          </a:xfrm>
+          <a:prstGeom prst="straightConnector1">
             <a:avLst/>
           </a:prstGeom>
           <a:ln w="12700">
@@ -3646,7 +3646,7 @@
         </p:nvSpPr>
         <p:spPr>
           <a:xfrm>
-            <a:off x="7875926" y="3143250"/>
+            <a:off x="7875926" y="3899264"/>
             <a:ext cx="101757" cy="864926"/>
           </a:xfrm>
           <a:prstGeom prst="rect">
@@ -3704,7 +3704,7 @@
         </p:nvSpPr>
         <p:spPr>
           <a:xfrm>
-            <a:off x="7980221" y="3363424"/>
+            <a:off x="7980221" y="4119438"/>
             <a:ext cx="96641" cy="151499"/>
           </a:xfrm>
           <a:prstGeom prst="rect">
@@ -3763,7 +3763,7 @@
         <p:spPr>
           <a:xfrm>
             <a:off x="1429527" y="1447800"/>
-            <a:ext cx="5423934" cy="3733800"/>
+            <a:ext cx="5423934" cy="4324082"/>
           </a:xfrm>
           <a:prstGeom prst="roundRect">
             <a:avLst>
@@ -3894,7 +3894,7 @@
         </p:nvSpPr>
         <p:spPr>
           <a:xfrm>
-            <a:off x="2839935" y="1754308"/>
+            <a:off x="2839935" y="2744555"/>
             <a:ext cx="1093635" cy="346760"/>
           </a:xfrm>
           <a:prstGeom prst="rect">
@@ -3959,7 +3959,7 @@
         </p:nvSpPr>
         <p:spPr>
           <a:xfrm>
-            <a:off x="4228873" y="2472861"/>
+            <a:off x="4228873" y="3228875"/>
             <a:ext cx="990600" cy="346760"/>
           </a:xfrm>
           <a:prstGeom prst="rect">
@@ -4024,7 +4024,7 @@
         </p:nvSpPr>
         <p:spPr>
           <a:xfrm>
-            <a:off x="5579606" y="4109721"/>
+            <a:off x="5579606" y="4865735"/>
             <a:ext cx="1111368" cy="346760"/>
           </a:xfrm>
           <a:prstGeom prst="rect">
@@ -4100,8 +4100,8 @@
         </p:nvCxnSpPr>
         <p:spPr>
           <a:xfrm>
-            <a:off x="2075593" y="2101069"/>
-            <a:ext cx="0" cy="2855075"/>
+            <a:off x="2075593" y="2101068"/>
+            <a:ext cx="0" cy="3537732"/>
           </a:xfrm>
           <a:prstGeom prst="line">
             <a:avLst/>
@@ -4148,8 +4148,8 @@
         </p:nvCxnSpPr>
         <p:spPr>
           <a:xfrm rot="16200000" flipH="1">
-            <a:off x="1960696" y="3527125"/>
-            <a:ext cx="2852284" cy="171"/>
+            <a:off x="2113011" y="4365057"/>
+            <a:ext cx="2547487" cy="2"/>
           </a:xfrm>
           <a:prstGeom prst="bentConnector3">
             <a:avLst>
@@ -4197,7 +4197,7 @@
         </p:nvCxnSpPr>
         <p:spPr>
           <a:xfrm>
-            <a:off x="4723789" y="2847306"/>
+            <a:off x="4723789" y="3603320"/>
             <a:ext cx="9857" cy="1955527"/>
           </a:xfrm>
           <a:prstGeom prst="line">
@@ -4243,7 +4243,7 @@
         <p:spPr>
           <a:xfrm>
             <a:off x="2020244" y="2335939"/>
-            <a:ext cx="101757" cy="2436670"/>
+            <a:ext cx="101757" cy="3192684"/>
           </a:xfrm>
           <a:prstGeom prst="rect">
             <a:avLst/>
@@ -4296,7 +4296,7 @@
         </p:nvSpPr>
         <p:spPr>
           <a:xfrm>
-            <a:off x="3333074" y="2555397"/>
+            <a:off x="3333074" y="3311411"/>
             <a:ext cx="97524" cy="416052"/>
           </a:xfrm>
           <a:prstGeom prst="rect">
@@ -4350,7 +4350,7 @@
         </p:nvSpPr>
         <p:spPr>
           <a:xfrm>
-            <a:off x="4666483" y="2835709"/>
+            <a:off x="4666483" y="3591723"/>
             <a:ext cx="110475" cy="77284"/>
           </a:xfrm>
           <a:prstGeom prst="rect">
@@ -4404,7 +4404,7 @@
         </p:nvSpPr>
         <p:spPr>
           <a:xfrm>
-            <a:off x="4685666" y="3061313"/>
+            <a:off x="4685666" y="3817327"/>
             <a:ext cx="96619" cy="1586875"/>
           </a:xfrm>
           <a:prstGeom prst="rect">
@@ -4458,7 +4458,7 @@
         </p:nvSpPr>
         <p:spPr>
           <a:xfrm>
-            <a:off x="6082225" y="4455014"/>
+            <a:off x="6082225" y="5211028"/>
             <a:ext cx="96641" cy="145402"/>
           </a:xfrm>
           <a:prstGeom prst="rect">
@@ -4559,7 +4559,7 @@
         </p:nvCxnSpPr>
         <p:spPr>
           <a:xfrm>
-            <a:off x="2117147" y="2562988"/>
+            <a:off x="2117147" y="3319002"/>
             <a:ext cx="1218609" cy="0"/>
           </a:xfrm>
           <a:prstGeom prst="straightConnector1">
@@ -4606,7 +4606,7 @@
         </p:nvCxnSpPr>
         <p:spPr>
           <a:xfrm>
-            <a:off x="3448479" y="2611780"/>
+            <a:off x="3448479" y="3367794"/>
             <a:ext cx="791237" cy="0"/>
           </a:xfrm>
           <a:prstGeom prst="straightConnector1">
@@ -4653,7 +4653,7 @@
         </p:nvCxnSpPr>
         <p:spPr>
           <a:xfrm>
-            <a:off x="2118607" y="3061313"/>
+            <a:off x="2118607" y="3817327"/>
             <a:ext cx="2572025" cy="0"/>
           </a:xfrm>
           <a:prstGeom prst="straightConnector1">
@@ -4700,7 +4700,7 @@
         </p:nvCxnSpPr>
         <p:spPr>
           <a:xfrm flipV="1">
-            <a:off x="4775173" y="3141279"/>
+            <a:off x="4775173" y="3897293"/>
             <a:ext cx="3100753" cy="7456"/>
           </a:xfrm>
           <a:prstGeom prst="straightConnector1">
@@ -4747,7 +4747,7 @@
         </p:nvCxnSpPr>
         <p:spPr>
           <a:xfrm flipH="1">
-            <a:off x="2111686" y="2978852"/>
+            <a:off x="2111686" y="3734866"/>
             <a:ext cx="1218609" cy="0"/>
           </a:xfrm>
           <a:prstGeom prst="straightConnector1">
@@ -4794,7 +4794,7 @@
         </p:nvCxnSpPr>
         <p:spPr>
           <a:xfrm flipH="1">
-            <a:off x="3436464" y="2914898"/>
+            <a:off x="3436464" y="3670912"/>
             <a:ext cx="1218609" cy="0"/>
           </a:xfrm>
           <a:prstGeom prst="straightConnector1">
@@ -4841,7 +4841,7 @@
         </p:nvCxnSpPr>
         <p:spPr>
           <a:xfrm flipH="1">
-            <a:off x="2118607" y="4648187"/>
+            <a:off x="2118607" y="5404201"/>
             <a:ext cx="2567058" cy="0"/>
           </a:xfrm>
           <a:prstGeom prst="straightConnector1">
@@ -4888,7 +4888,7 @@
         </p:nvCxnSpPr>
         <p:spPr>
           <a:xfrm flipH="1">
-            <a:off x="1000338" y="4772608"/>
+            <a:off x="1000338" y="5528622"/>
             <a:ext cx="1013795" cy="0"/>
           </a:xfrm>
           <a:prstGeom prst="straightConnector1">
@@ -4935,7 +4935,7 @@
         </p:nvCxnSpPr>
         <p:spPr>
           <a:xfrm flipH="1">
-            <a:off x="4791646" y="4606512"/>
+            <a:off x="4791646" y="5362526"/>
             <a:ext cx="1279149" cy="0"/>
           </a:xfrm>
           <a:prstGeom prst="straightConnector1">
@@ -5019,7 +5019,7 @@
         </p:nvSpPr>
         <p:spPr>
           <a:xfrm>
-            <a:off x="4619664" y="4728154"/>
+            <a:off x="4619664" y="5484168"/>
             <a:ext cx="223185" cy="230832"/>
           </a:xfrm>
           <a:prstGeom prst="rect">
@@ -5054,7 +5054,7 @@
         </p:nvSpPr>
         <p:spPr>
           <a:xfrm>
-            <a:off x="2184605" y="2355920"/>
+            <a:off x="2184605" y="3111934"/>
             <a:ext cx="1113763" cy="230832"/>
           </a:xfrm>
           <a:prstGeom prst="rect">
@@ -5094,7 +5094,7 @@
         </p:nvSpPr>
         <p:spPr>
           <a:xfrm>
-            <a:off x="3469738" y="3024466"/>
+            <a:off x="3469738" y="3780480"/>
             <a:ext cx="1113763" cy="230832"/>
           </a:xfrm>
           <a:prstGeom prst="rect">
@@ -5133,7 +5133,7 @@
         </p:nvSpPr>
         <p:spPr>
           <a:xfrm>
-            <a:off x="5219474" y="2926614"/>
+            <a:off x="5219474" y="3682628"/>
             <a:ext cx="2429281" cy="230832"/>
           </a:xfrm>
           <a:prstGeom prst="rect">
@@ -5172,7 +5172,7 @@
         </p:nvSpPr>
         <p:spPr>
           <a:xfrm>
-            <a:off x="2618650" y="4452576"/>
+            <a:off x="2618650" y="5208590"/>
             <a:ext cx="1113763" cy="230832"/>
           </a:xfrm>
           <a:prstGeom prst="rect">
@@ -5212,7 +5212,7 @@
         </p:nvSpPr>
         <p:spPr>
           <a:xfrm>
-            <a:off x="1290697" y="4572000"/>
+            <a:off x="1290697" y="5328014"/>
             <a:ext cx="476147" cy="230832"/>
           </a:xfrm>
           <a:prstGeom prst="rect">
@@ -5251,7 +5251,7 @@
         </p:nvSpPr>
         <p:spPr>
           <a:xfrm>
-            <a:off x="2575894" y="2775802"/>
+            <a:off x="2575894" y="3531816"/>
             <a:ext cx="206784" cy="230832"/>
           </a:xfrm>
           <a:prstGeom prst="rect">
@@ -5290,7 +5290,7 @@
         </p:nvSpPr>
         <p:spPr>
           <a:xfrm>
-            <a:off x="7975057" y="3706324"/>
+            <a:off x="7975057" y="4462338"/>
             <a:ext cx="96641" cy="151499"/>
           </a:xfrm>
           <a:prstGeom prst="rect">
@@ -5350,7 +5350,7 @@
         </p:nvCxnSpPr>
         <p:spPr>
           <a:xfrm flipH="1">
-            <a:off x="4782284" y="4008176"/>
+            <a:off x="4782284" y="4764190"/>
             <a:ext cx="3093642" cy="0"/>
           </a:xfrm>
           <a:prstGeom prst="straightConnector1">
@@ -5399,7 +5399,7 @@
         </p:nvCxnSpPr>
         <p:spPr>
           <a:xfrm>
-            <a:off x="4803076" y="4109721"/>
+            <a:off x="4803076" y="4865735"/>
             <a:ext cx="776531" cy="0"/>
           </a:xfrm>
           <a:prstGeom prst="straightConnector1">
@@ -5446,7 +5446,7 @@
         </p:nvCxnSpPr>
         <p:spPr>
           <a:xfrm>
-            <a:off x="7973276" y="3269760"/>
+            <a:off x="7973276" y="4025774"/>
             <a:ext cx="112082" cy="87946"/>
           </a:xfrm>
           <a:prstGeom prst="curvedConnector3">
@@ -5497,7 +5497,7 @@
         </p:nvCxnSpPr>
         <p:spPr>
           <a:xfrm>
-            <a:off x="7965135" y="3614922"/>
+            <a:off x="7965135" y="4370936"/>
             <a:ext cx="112082" cy="87946"/>
           </a:xfrm>
           <a:prstGeom prst="curvedConnector3">
@@ -5546,7 +5546,7 @@
         </p:nvSpPr>
         <p:spPr>
           <a:xfrm>
-            <a:off x="8122714" y="3082834"/>
+            <a:off x="8122714" y="3838848"/>
             <a:ext cx="2603212" cy="230832"/>
           </a:xfrm>
           <a:prstGeom prst="rect">
@@ -5585,7 +5585,7 @@
         </p:nvSpPr>
         <p:spPr>
           <a:xfrm>
-            <a:off x="8127530" y="3428063"/>
+            <a:off x="8127530" y="4184077"/>
             <a:ext cx="2979397" cy="230832"/>
           </a:xfrm>
           <a:prstGeom prst="rect">
@@ -5606,6 +5606,244 @@
                 </a:solidFill>
               </a:rPr>
               <a:t>updateFilteredEntryList(PREDICATE_SHOW_ALL_ENTRIES)</a:t>
+            </a:r>
+          </a:p>
+        </p:txBody>
+      </p:sp>
+      <p:cxnSp>
+        <p:nvCxnSpPr>
+          <p:cNvPr id="45" name="Straight Arrow Connector 44">
+            <a:extLst>
+              <a:ext uri="{FF2B5EF4-FFF2-40B4-BE49-F238E27FC236}">
+                <a16:creationId xmlns:a16="http://schemas.microsoft.com/office/drawing/2014/main" id="{0BE35962-64C2-4EA5-97F7-EAD7D20B743D}"/>
+              </a:ext>
+            </a:extLst>
+          </p:cNvPr>
+          <p:cNvCxnSpPr>
+            <a:cxnSpLocks/>
+          </p:cNvCxnSpPr>
+          <p:nvPr/>
+        </p:nvCxnSpPr>
+        <p:spPr>
+          <a:xfrm flipV="1">
+            <a:off x="2118607" y="2438400"/>
+            <a:ext cx="5778111" cy="1"/>
+          </a:xfrm>
+          <a:prstGeom prst="bentConnector3">
+            <a:avLst>
+              <a:gd name="adj1" fmla="val 50000"/>
+            </a:avLst>
+          </a:prstGeom>
+          <a:ln w="9525">
+            <a:solidFill>
+              <a:srgbClr val="0070C0"/>
+            </a:solidFill>
+            <a:prstDash val="solid"/>
+            <a:headEnd type="none" w="med" len="med"/>
+            <a:tailEnd type="arrow"/>
+          </a:ln>
+          <a:effectLst/>
+        </p:spPr>
+        <p:style>
+          <a:lnRef idx="1">
+            <a:schemeClr val="accent2"/>
+          </a:lnRef>
+          <a:fillRef idx="2">
+            <a:schemeClr val="accent2"/>
+          </a:fillRef>
+          <a:effectRef idx="1">
+            <a:schemeClr val="accent2"/>
+          </a:effectRef>
+          <a:fontRef idx="minor">
+            <a:schemeClr val="dk1"/>
+          </a:fontRef>
+        </p:style>
+      </p:cxnSp>
+      <p:sp>
+        <p:nvSpPr>
+          <p:cNvPr id="53" name="Rectangle 52">
+            <a:extLst>
+              <a:ext uri="{FF2B5EF4-FFF2-40B4-BE49-F238E27FC236}">
+                <a16:creationId xmlns:a16="http://schemas.microsoft.com/office/drawing/2014/main" id="{81BF8FA4-1F1E-4A0A-9018-108BAA86B0B1}"/>
+              </a:ext>
+            </a:extLst>
+          </p:cNvPr>
+          <p:cNvSpPr/>
+          <p:nvPr/>
+        </p:nvSpPr>
+        <p:spPr>
+          <a:xfrm>
+            <a:off x="7891410" y="2423491"/>
+            <a:ext cx="96641" cy="151499"/>
+          </a:xfrm>
+          <a:prstGeom prst="rect">
+            <a:avLst/>
+          </a:prstGeom>
+          <a:solidFill>
+            <a:schemeClr val="accent4">
+              <a:lumMod val="75000"/>
+            </a:schemeClr>
+          </a:solidFill>
+          <a:ln>
+            <a:solidFill>
+              <a:schemeClr val="accent4">
+                <a:lumMod val="75000"/>
+              </a:schemeClr>
+            </a:solidFill>
+          </a:ln>
+        </p:spPr>
+        <p:style>
+          <a:lnRef idx="2">
+            <a:schemeClr val="accent1">
+              <a:shade val="50000"/>
+            </a:schemeClr>
+          </a:lnRef>
+          <a:fillRef idx="1">
+            <a:schemeClr val="accent1"/>
+          </a:fillRef>
+          <a:effectRef idx="0">
+            <a:schemeClr val="accent1"/>
+          </a:effectRef>
+          <a:fontRef idx="minor">
+            <a:schemeClr val="lt1"/>
+          </a:fontRef>
+        </p:style>
+        <p:txBody>
+          <a:bodyPr rtlCol="0" anchor="ctr"/>
+          <a:lstStyle/>
+          <a:p>
+            <a:pPr algn="ctr"/>
+            <a:endParaRPr lang="en-SG"/>
+          </a:p>
+        </p:txBody>
+      </p:sp>
+      <p:cxnSp>
+        <p:nvCxnSpPr>
+          <p:cNvPr id="56" name="Straight Arrow Connector 55">
+            <a:extLst>
+              <a:ext uri="{FF2B5EF4-FFF2-40B4-BE49-F238E27FC236}">
+                <a16:creationId xmlns:a16="http://schemas.microsoft.com/office/drawing/2014/main" id="{10333FBF-5091-4A89-A2C0-13A20476F9EE}"/>
+              </a:ext>
+            </a:extLst>
+          </p:cNvPr>
+          <p:cNvCxnSpPr>
+            <a:cxnSpLocks/>
+          </p:cNvCxnSpPr>
+          <p:nvPr/>
+        </p:nvCxnSpPr>
+        <p:spPr>
+          <a:xfrm rot="10800000" flipV="1">
+            <a:off x="2112067" y="2584056"/>
+            <a:ext cx="5779574" cy="1663"/>
+          </a:xfrm>
+          <a:prstGeom prst="bentConnector3">
+            <a:avLst>
+              <a:gd name="adj1" fmla="val 50000"/>
+            </a:avLst>
+          </a:prstGeom>
+          <a:ln w="9525">
+            <a:solidFill>
+              <a:schemeClr val="accent4">
+                <a:lumMod val="75000"/>
+              </a:schemeClr>
+            </a:solidFill>
+            <a:prstDash val="sysDash"/>
+            <a:headEnd type="none" w="med" len="med"/>
+            <a:tailEnd type="arrow"/>
+          </a:ln>
+          <a:effectLst/>
+        </p:spPr>
+        <p:style>
+          <a:lnRef idx="1">
+            <a:schemeClr val="accent2"/>
+          </a:lnRef>
+          <a:fillRef idx="2">
+            <a:schemeClr val="accent2"/>
+          </a:fillRef>
+          <a:effectRef idx="1">
+            <a:schemeClr val="accent2"/>
+          </a:effectRef>
+          <a:fontRef idx="minor">
+            <a:schemeClr val="dk1"/>
+          </a:fontRef>
+        </p:style>
+      </p:cxnSp>
+      <p:sp>
+        <p:nvSpPr>
+          <p:cNvPr id="63" name="TextBox 62">
+            <a:extLst>
+              <a:ext uri="{FF2B5EF4-FFF2-40B4-BE49-F238E27FC236}">
+                <a16:creationId xmlns:a16="http://schemas.microsoft.com/office/drawing/2014/main" id="{E870A418-097D-4BE9-BFC6-E8EE4B1E4A7C}"/>
+              </a:ext>
+            </a:extLst>
+          </p:cNvPr>
+          <p:cNvSpPr txBox="1"/>
+          <p:nvPr/>
+        </p:nvSpPr>
+        <p:spPr>
+          <a:xfrm>
+            <a:off x="4593507" y="2242149"/>
+            <a:ext cx="816694" cy="230832"/>
+          </a:xfrm>
+          <a:prstGeom prst="rect">
+            <a:avLst/>
+          </a:prstGeom>
+          <a:noFill/>
+        </p:spPr>
+        <p:txBody>
+          <a:bodyPr wrap="square" rtlCol="0">
+            <a:spAutoFit/>
+          </a:bodyPr>
+          <a:lstStyle/>
+          <a:p>
+            <a:pPr algn="ctr"/>
+            <a:r>
+              <a:rPr lang="en-SG" sz="900" dirty="0">
+                <a:solidFill>
+                  <a:srgbClr val="7030A0"/>
+                </a:solidFill>
+              </a:rPr>
+              <a:t>getContext()</a:t>
+            </a:r>
+          </a:p>
+        </p:txBody>
+      </p:sp>
+      <p:sp>
+        <p:nvSpPr>
+          <p:cNvPr id="65" name="TextBox 64">
+            <a:extLst>
+              <a:ext uri="{FF2B5EF4-FFF2-40B4-BE49-F238E27FC236}">
+                <a16:creationId xmlns:a16="http://schemas.microsoft.com/office/drawing/2014/main" id="{2269D0E8-3D09-408F-B179-ECE399C825EB}"/>
+              </a:ext>
+            </a:extLst>
+          </p:cNvPr>
+          <p:cNvSpPr txBox="1"/>
+          <p:nvPr/>
+        </p:nvSpPr>
+        <p:spPr>
+          <a:xfrm>
+            <a:off x="4048734" y="2563208"/>
+            <a:ext cx="1894866" cy="230832"/>
+          </a:xfrm>
+          <a:prstGeom prst="rect">
+            <a:avLst/>
+          </a:prstGeom>
+          <a:noFill/>
+        </p:spPr>
+        <p:txBody>
+          <a:bodyPr wrap="square" rtlCol="0">
+            <a:spAutoFit/>
+          </a:bodyPr>
+          <a:lstStyle/>
+          <a:p>
+            <a:pPr algn="ctr"/>
+            <a:r>
+              <a:rPr lang="en-SG" sz="900" dirty="0">
+                <a:solidFill>
+                  <a:srgbClr val="0070C0"/>
+                </a:solidFill>
+              </a:rPr>
+              <a:t>modelContext:ModelContext</a:t>
             </a:r>
           </a:p>
         </p:txBody>

</xml_diff>

<commit_message>
Update and add diagrams
</commit_message>
<xml_diff>
--- a/docs/diagrams/ChangeContextSdForModel.pptx
+++ b/docs/diagrams/ChangeContextSdForModel.pptx
@@ -208,7 +208,7 @@
           <a:p>
             <a:fld id="{F5CC4B3F-88C1-4FFA-B1B6-F41C21DC6924}" type="datetimeFigureOut">
               <a:rPr lang="en-US" smtClean="0"/>
-              <a:t>4/9/2019</a:t>
+              <a:t>4/15/2019</a:t>
             </a:fld>
             <a:endParaRPr lang="en-US"/>
           </a:p>
@@ -654,7 +654,7 @@
           <a:p>
             <a:fld id="{78C97017-6FC3-485B-9764-EAC9E56C1D49}" type="datetimeFigureOut">
               <a:rPr lang="en-US" smtClean="0"/>
-              <a:t>4/9/2019</a:t>
+              <a:t>4/15/2019</a:t>
             </a:fld>
             <a:endParaRPr lang="en-US"/>
           </a:p>
@@ -822,7 +822,7 @@
           <a:p>
             <a:fld id="{78C97017-6FC3-485B-9764-EAC9E56C1D49}" type="datetimeFigureOut">
               <a:rPr lang="en-US" smtClean="0"/>
-              <a:t>4/9/2019</a:t>
+              <a:t>4/15/2019</a:t>
             </a:fld>
             <a:endParaRPr lang="en-US"/>
           </a:p>
@@ -1000,7 +1000,7 @@
           <a:p>
             <a:fld id="{78C97017-6FC3-485B-9764-EAC9E56C1D49}" type="datetimeFigureOut">
               <a:rPr lang="en-US" smtClean="0"/>
-              <a:t>4/9/2019</a:t>
+              <a:t>4/15/2019</a:t>
             </a:fld>
             <a:endParaRPr lang="en-US"/>
           </a:p>
@@ -1168,7 +1168,7 @@
           <a:p>
             <a:fld id="{78C97017-6FC3-485B-9764-EAC9E56C1D49}" type="datetimeFigureOut">
               <a:rPr lang="en-US" smtClean="0"/>
-              <a:t>4/9/2019</a:t>
+              <a:t>4/15/2019</a:t>
             </a:fld>
             <a:endParaRPr lang="en-US"/>
           </a:p>
@@ -1413,7 +1413,7 @@
           <a:p>
             <a:fld id="{78C97017-6FC3-485B-9764-EAC9E56C1D49}" type="datetimeFigureOut">
               <a:rPr lang="en-US" smtClean="0"/>
-              <a:t>4/9/2019</a:t>
+              <a:t>4/15/2019</a:t>
             </a:fld>
             <a:endParaRPr lang="en-US"/>
           </a:p>
@@ -1698,7 +1698,7 @@
           <a:p>
             <a:fld id="{78C97017-6FC3-485B-9764-EAC9E56C1D49}" type="datetimeFigureOut">
               <a:rPr lang="en-US" smtClean="0"/>
-              <a:t>4/9/2019</a:t>
+              <a:t>4/15/2019</a:t>
             </a:fld>
             <a:endParaRPr lang="en-US"/>
           </a:p>
@@ -2117,7 +2117,7 @@
           <a:p>
             <a:fld id="{78C97017-6FC3-485B-9764-EAC9E56C1D49}" type="datetimeFigureOut">
               <a:rPr lang="en-US" smtClean="0"/>
-              <a:t>4/9/2019</a:t>
+              <a:t>4/15/2019</a:t>
             </a:fld>
             <a:endParaRPr lang="en-US"/>
           </a:p>
@@ -2234,7 +2234,7 @@
           <a:p>
             <a:fld id="{78C97017-6FC3-485B-9764-EAC9E56C1D49}" type="datetimeFigureOut">
               <a:rPr lang="en-US" smtClean="0"/>
-              <a:t>4/9/2019</a:t>
+              <a:t>4/15/2019</a:t>
             </a:fld>
             <a:endParaRPr lang="en-US"/>
           </a:p>
@@ -2329,7 +2329,7 @@
           <a:p>
             <a:fld id="{78C97017-6FC3-485B-9764-EAC9E56C1D49}" type="datetimeFigureOut">
               <a:rPr lang="en-US" smtClean="0"/>
-              <a:t>4/9/2019</a:t>
+              <a:t>4/15/2019</a:t>
             </a:fld>
             <a:endParaRPr lang="en-US"/>
           </a:p>
@@ -2604,7 +2604,7 @@
           <a:p>
             <a:fld id="{78C97017-6FC3-485B-9764-EAC9E56C1D49}" type="datetimeFigureOut">
               <a:rPr lang="en-US" smtClean="0"/>
-              <a:t>4/9/2019</a:t>
+              <a:t>4/15/2019</a:t>
             </a:fld>
             <a:endParaRPr lang="en-US"/>
           </a:p>
@@ -2856,7 +2856,7 @@
           <a:p>
             <a:fld id="{78C97017-6FC3-485B-9764-EAC9E56C1D49}" type="datetimeFigureOut">
               <a:rPr lang="en-US" smtClean="0"/>
-              <a:t>4/9/2019</a:t>
+              <a:t>4/15/2019</a:t>
             </a:fld>
             <a:endParaRPr lang="en-US"/>
           </a:p>
@@ -3067,7 +3067,7 @@
           <a:p>
             <a:fld id="{78C97017-6FC3-485B-9764-EAC9E56C1D49}" type="datetimeFigureOut">
               <a:rPr lang="en-US" smtClean="0"/>
-              <a:t>4/9/2019</a:t>
+              <a:t>4/15/2019</a:t>
             </a:fld>
             <a:endParaRPr lang="en-US"/>
           </a:p>
@@ -5460,7 +5460,7 @@
                 <a:lumMod val="75000"/>
               </a:schemeClr>
             </a:solidFill>
-            <a:prstDash val="sysDot"/>
+            <a:prstDash val="solid"/>
             <a:headEnd type="none" w="med" len="med"/>
             <a:tailEnd type="triangle"/>
           </a:ln>
@@ -5511,7 +5511,7 @@
                 <a:lumMod val="75000"/>
               </a:schemeClr>
             </a:solidFill>
-            <a:prstDash val="sysDot"/>
+            <a:prstDash val="solid"/>
             <a:headEnd type="none" w="med" len="med"/>
             <a:tailEnd type="triangle"/>
           </a:ln>
@@ -5566,7 +5566,7 @@
                   <a:srgbClr val="7030A0"/>
                 </a:solidFill>
               </a:rPr>
-              <a:t>displayEntryBook(archivesEntryBook:EntryBook)</a:t>
+              <a:t>displayEntryBook(archivesEntryBook)</a:t>
             </a:r>
           </a:p>
         </p:txBody>
@@ -5843,7 +5843,7 @@
                   <a:srgbClr val="0070C0"/>
                 </a:solidFill>
               </a:rPr>
-              <a:t>modelContext:ModelContext</a:t>
+              <a:t>CONTEXT_LIST:ModelContext</a:t>
             </a:r>
           </a:p>
         </p:txBody>

</xml_diff>